<commit_message>
Updated presentation with minor edits and comments
</commit_message>
<xml_diff>
--- a/Project Presentation.pptx
+++ b/Project Presentation.pptx
@@ -5898,8 +5898,16 @@
         <a:lstStyle/>
         <a:p>
           <a:r>
-            <a:rPr lang="en-US"/>
-            <a:t>Getting the keylogger to send emails to the gmail account</a:t>
+            <a:rPr lang="en-US" dirty="0"/>
+            <a:t>Getting the keylogger to send emails to the </a:t>
+          </a:r>
+          <a:r>
+            <a:rPr lang="en-US" dirty="0" err="1"/>
+            <a:t>gmail</a:t>
+          </a:r>
+          <a:r>
+            <a:rPr lang="en-US" dirty="0"/>
+            <a:t> account</a:t>
           </a:r>
         </a:p>
       </dgm:t>
@@ -5937,7 +5945,7 @@
         <a:lstStyle/>
         <a:p>
           <a:r>
-            <a:rPr lang="en-US"/>
+            <a:rPr lang="en-US" dirty="0"/>
             <a:t>Gmail has extra security measures that had to be disabled</a:t>
           </a:r>
         </a:p>
@@ -5973,7 +5981,7 @@
         <a:lstStyle/>
         <a:p>
           <a:r>
-            <a:rPr lang="en-US"/>
+            <a:rPr lang="en-US" dirty="0"/>
             <a:t>Getting the Program to capture screen shots of the user's screen</a:t>
           </a:r>
         </a:p>
@@ -6116,7 +6124,7 @@
   <dgm:whole/>
   <dgm:extLst>
     <a:ext uri="http://schemas.microsoft.com/office/drawing/2008/diagram">
-      <dsp:dataModelExt xmlns:dsp="http://schemas.microsoft.com/office/drawing/2008/diagram" relId="rId8" minVer="http://schemas.openxmlformats.org/drawingml/2006/diagram"/>
+      <dsp:dataModelExt xmlns:dsp="http://schemas.microsoft.com/office/drawing/2008/diagram" relId="rId9" minVer="http://schemas.openxmlformats.org/drawingml/2006/diagram"/>
     </a:ext>
   </dgm:extLst>
 </dgm:dataModel>
@@ -6620,7 +6628,7 @@
   <dgm:whole/>
   <dgm:extLst>
     <a:ext uri="http://schemas.microsoft.com/office/drawing/2008/diagram">
-      <dsp:dataModelExt xmlns:dsp="http://schemas.microsoft.com/office/drawing/2008/diagram" relId="rId8" minVer="http://schemas.openxmlformats.org/drawingml/2006/diagram"/>
+      <dsp:dataModelExt xmlns:dsp="http://schemas.microsoft.com/office/drawing/2008/diagram" relId="rId9" minVer="http://schemas.openxmlformats.org/drawingml/2006/diagram"/>
     </a:ext>
   </dgm:extLst>
 </dgm:dataModel>
@@ -6756,7 +6764,7 @@
         <a:lstStyle/>
         <a:p>
           <a:r>
-            <a:rPr lang="en-US"/>
+            <a:rPr lang="en-US" dirty="0"/>
             <a:t>Anti-spyware programs (for software keyloggers)</a:t>
           </a:r>
         </a:p>
@@ -8177,8 +8185,16 @@
             <a:buNone/>
           </a:pPr>
           <a:r>
-            <a:rPr lang="en-US" sz="2300" kern="1200"/>
-            <a:t>Getting the keylogger to send emails to the gmail account</a:t>
+            <a:rPr lang="en-US" sz="2300" kern="1200" dirty="0"/>
+            <a:t>Getting the keylogger to send emails to the </a:t>
+          </a:r>
+          <a:r>
+            <a:rPr lang="en-US" sz="2300" kern="1200" dirty="0" err="1"/>
+            <a:t>gmail</a:t>
+          </a:r>
+          <a:r>
+            <a:rPr lang="en-US" sz="2300" kern="1200" dirty="0"/>
+            <a:t> account</a:t>
           </a:r>
         </a:p>
         <a:p>
@@ -8195,7 +8211,7 @@
             <a:buChar char="•"/>
           </a:pPr>
           <a:r>
-            <a:rPr lang="en-US" sz="1800" kern="1200"/>
+            <a:rPr lang="en-US" sz="1800" kern="1200" dirty="0"/>
             <a:t>Gmail has extra security measures that had to be disabled</a:t>
           </a:r>
         </a:p>
@@ -8400,7 +8416,7 @@
             <a:buNone/>
           </a:pPr>
           <a:r>
-            <a:rPr lang="en-US" sz="2300" kern="1200"/>
+            <a:rPr lang="en-US" sz="2300" kern="1200" dirty="0"/>
             <a:t>Getting the Program to capture screen shots of the user's screen</a:t>
           </a:r>
         </a:p>
@@ -9286,7 +9302,7 @@
             <a:buNone/>
           </a:pPr>
           <a:r>
-            <a:rPr lang="en-US" sz="2500" kern="1200"/>
+            <a:rPr lang="en-US" sz="2500" kern="1200" dirty="0"/>
             <a:t>Anti-spyware programs (for software keyloggers)</a:t>
           </a:r>
         </a:p>
@@ -17002,7 +17018,7 @@
           <a:p>
             <a:fld id="{573D0F86-F2C9-48AA-A4D8-857AD85DB1AB}" type="datetimeFigureOut">
               <a:rPr lang="en-US" smtClean="0"/>
-              <a:t>4/30/2021</a:t>
+              <a:t>2021-05-04</a:t>
             </a:fld>
             <a:endParaRPr lang="en-US"/>
           </a:p>
@@ -17313,9 +17329,805 @@
           <a:bodyPr/>
           <a:lstStyle/>
           <a:p>
+            <a:endParaRPr lang="en-US" dirty="0"/>
+          </a:p>
+        </p:txBody>
+      </p:sp>
+      <p:sp>
+        <p:nvSpPr>
+          <p:cNvPr id="4" name="Slide Number Placeholder 3"/>
+          <p:cNvSpPr>
+            <a:spLocks noGrp="1"/>
+          </p:cNvSpPr>
+          <p:nvPr>
+            <p:ph type="sldNum" sz="quarter" idx="5"/>
+          </p:nvPr>
+        </p:nvSpPr>
+        <p:spPr/>
+        <p:txBody>
+          <a:bodyPr/>
+          <a:lstStyle/>
+          <a:p>
+            <a:fld id="{CE989B39-9896-4416-8F69-B5D2DF855C70}" type="slidenum">
+              <a:rPr lang="en-US" smtClean="0"/>
+              <a:t>5</a:t>
+            </a:fld>
+            <a:endParaRPr lang="en-US"/>
+          </a:p>
+        </p:txBody>
+      </p:sp>
+    </p:spTree>
+    <p:extLst>
+      <p:ext uri="{BB962C8B-B14F-4D97-AF65-F5344CB8AC3E}">
+        <p14:creationId xmlns:p14="http://schemas.microsoft.com/office/powerpoint/2010/main" val="129367941"/>
+      </p:ext>
+    </p:extLst>
+  </p:cSld>
+  <p:clrMapOvr>
+    <a:masterClrMapping/>
+  </p:clrMapOvr>
+</p:notes>
+</file>
+
+<file path=ppt/notesSlides/notesSlide2.xml><?xml version="1.0" encoding="utf-8"?>
+<p:notes xmlns:a="http://schemas.openxmlformats.org/drawingml/2006/main" xmlns:r="http://schemas.openxmlformats.org/officeDocument/2006/relationships" xmlns:p="http://schemas.openxmlformats.org/presentationml/2006/main">
+  <p:cSld>
+    <p:spTree>
+      <p:nvGrpSpPr>
+        <p:cNvPr id="1" name=""/>
+        <p:cNvGrpSpPr/>
+        <p:nvPr/>
+      </p:nvGrpSpPr>
+      <p:grpSpPr>
+        <a:xfrm>
+          <a:off x="0" y="0"/>
+          <a:ext cx="0" cy="0"/>
+          <a:chOff x="0" y="0"/>
+          <a:chExt cx="0" cy="0"/>
+        </a:xfrm>
+      </p:grpSpPr>
+      <p:sp>
+        <p:nvSpPr>
+          <p:cNvPr id="2" name="Slide Image Placeholder 1"/>
+          <p:cNvSpPr>
+            <a:spLocks noGrp="1" noRot="1" noChangeAspect="1"/>
+          </p:cNvSpPr>
+          <p:nvPr>
+            <p:ph type="sldImg"/>
+          </p:nvPr>
+        </p:nvSpPr>
+        <p:spPr/>
+      </p:sp>
+      <p:sp>
+        <p:nvSpPr>
+          <p:cNvPr id="3" name="Notes Placeholder 2"/>
+          <p:cNvSpPr>
+            <a:spLocks noGrp="1"/>
+          </p:cNvSpPr>
+          <p:nvPr>
+            <p:ph type="body" idx="1"/>
+          </p:nvPr>
+        </p:nvSpPr>
+        <p:spPr/>
+        <p:txBody>
+          <a:bodyPr/>
+          <a:lstStyle/>
+          <a:p>
+            <a:pPr marL="0" marR="0" lvl="0" indent="0" algn="l" defTabSz="914400" rtl="0" eaLnBrk="1" fontAlgn="auto" latinLnBrk="0" hangingPunct="1">
+              <a:lnSpc>
+                <a:spcPct val="100000"/>
+              </a:lnSpc>
+              <a:spcBef>
+                <a:spcPts val="0"/>
+              </a:spcBef>
+              <a:spcAft>
+                <a:spcPts val="0"/>
+              </a:spcAft>
+              <a:buClrTx/>
+              <a:buSzTx/>
+              <a:buFontTx/>
+              <a:buNone/>
+              <a:tabLst/>
+              <a:defRPr/>
+            </a:pPr>
+            <a:r>
+              <a:rPr lang="en-US" sz="1800" dirty="0"/>
+              <a:t>Storing email contents</a:t>
+            </a:r>
+          </a:p>
+          <a:p>
+            <a:pPr marL="0" marR="0" lvl="0" indent="0" algn="l" defTabSz="914400" rtl="0" eaLnBrk="1" fontAlgn="auto" latinLnBrk="0" hangingPunct="1">
+              <a:lnSpc>
+                <a:spcPct val="100000"/>
+              </a:lnSpc>
+              <a:spcBef>
+                <a:spcPts val="0"/>
+              </a:spcBef>
+              <a:spcAft>
+                <a:spcPts val="0"/>
+              </a:spcAft>
+              <a:buClrTx/>
+              <a:buSzTx/>
+              <a:buFontTx/>
+              <a:buNone/>
+              <a:tabLst/>
+              <a:defRPr/>
+            </a:pPr>
+            <a:r>
+              <a:rPr lang="en-US" sz="1800" dirty="0"/>
+              <a:t>Storing key output values</a:t>
+            </a:r>
+          </a:p>
+          <a:p>
+            <a:pPr marL="0" marR="0" lvl="0" indent="0" algn="l" defTabSz="914400" rtl="0" eaLnBrk="1" fontAlgn="auto" latinLnBrk="0" hangingPunct="1">
+              <a:lnSpc>
+                <a:spcPct val="100000"/>
+              </a:lnSpc>
+              <a:spcBef>
+                <a:spcPts val="0"/>
+              </a:spcBef>
+              <a:spcAft>
+                <a:spcPts val="0"/>
+              </a:spcAft>
+              <a:buClrTx/>
+              <a:buSzTx/>
+              <a:buFontTx/>
+              <a:buNone/>
+              <a:tabLst/>
+              <a:defRPr/>
+            </a:pPr>
+            <a:r>
+              <a:rPr lang="en-US" sz="1800" dirty="0"/>
+              <a:t>Setting email char limit</a:t>
+            </a:r>
+          </a:p>
+          <a:p>
+            <a:r>
+              <a:rPr lang="en-US" sz="1800" dirty="0"/>
+              <a:t>-50 for testing</a:t>
+            </a:r>
+          </a:p>
+          <a:p>
+            <a:endParaRPr lang="en-US" sz="1800" dirty="0"/>
+          </a:p>
+          <a:p>
+            <a:r>
+              <a:rPr lang="en-US" sz="1800" dirty="0"/>
+              <a:t>Starting at line 17, and going to line 86, </a:t>
+            </a:r>
+            <a:r>
+              <a:rPr lang="en-US" sz="1800" dirty="0" err="1"/>
+              <a:t>on_press</a:t>
+            </a:r>
+            <a:r>
+              <a:rPr lang="en-US" sz="1800" dirty="0"/>
+              <a:t>(key)</a:t>
+            </a:r>
+          </a:p>
+          <a:p>
+            <a:r>
+              <a:rPr lang="en-US" sz="1800" dirty="0"/>
+              <a:t>-</a:t>
+            </a:r>
+            <a:r>
+              <a:rPr lang="en-US" sz="1600" dirty="0"/>
+              <a:t>Collects input of the keys a user presses</a:t>
+            </a:r>
+          </a:p>
+          <a:p>
+            <a:r>
+              <a:rPr lang="en-US" sz="1600" dirty="0"/>
+              <a:t>-Translates into an easily readable format (</a:t>
+            </a:r>
+            <a:r>
+              <a:rPr lang="en-US" sz="1600" dirty="0" err="1"/>
+              <a:t>ie</a:t>
+            </a:r>
+            <a:r>
+              <a:rPr lang="en-US" sz="1600" dirty="0"/>
+              <a:t> Key.f1 -&gt; [F1])</a:t>
+            </a:r>
+          </a:p>
+          <a:p>
+            <a:endParaRPr lang="en-US" sz="1600" dirty="0"/>
+          </a:p>
+          <a:p>
+            <a:r>
+              <a:rPr lang="en-US" sz="1800" dirty="0"/>
+              <a:t>Line 34 checks to see if the email limit has been reached</a:t>
+            </a:r>
+          </a:p>
+          <a:p>
+            <a:r>
+              <a:rPr lang="en-US" sz="1600" dirty="0"/>
+              <a:t>-if reached or surpassed, sends an email</a:t>
+            </a:r>
+          </a:p>
+        </p:txBody>
+      </p:sp>
+      <p:sp>
+        <p:nvSpPr>
+          <p:cNvPr id="4" name="Slide Number Placeholder 3"/>
+          <p:cNvSpPr>
+            <a:spLocks noGrp="1"/>
+          </p:cNvSpPr>
+          <p:nvPr>
+            <p:ph type="sldNum" sz="quarter" idx="5"/>
+          </p:nvPr>
+        </p:nvSpPr>
+        <p:spPr/>
+        <p:txBody>
+          <a:bodyPr/>
+          <a:lstStyle/>
+          <a:p>
+            <a:fld id="{CE989B39-9896-4416-8F69-B5D2DF855C70}" type="slidenum">
+              <a:rPr lang="en-US" smtClean="0"/>
+              <a:t>7</a:t>
+            </a:fld>
+            <a:endParaRPr lang="en-US"/>
+          </a:p>
+        </p:txBody>
+      </p:sp>
+    </p:spTree>
+    <p:extLst>
+      <p:ext uri="{BB962C8B-B14F-4D97-AF65-F5344CB8AC3E}">
+        <p14:creationId xmlns:p14="http://schemas.microsoft.com/office/powerpoint/2010/main" val="215316414"/>
+      </p:ext>
+    </p:extLst>
+  </p:cSld>
+  <p:clrMapOvr>
+    <a:masterClrMapping/>
+  </p:clrMapOvr>
+</p:notes>
+</file>
+
+<file path=ppt/notesSlides/notesSlide3.xml><?xml version="1.0" encoding="utf-8"?>
+<p:notes xmlns:a="http://schemas.openxmlformats.org/drawingml/2006/main" xmlns:r="http://schemas.openxmlformats.org/officeDocument/2006/relationships" xmlns:p="http://schemas.openxmlformats.org/presentationml/2006/main">
+  <p:cSld>
+    <p:spTree>
+      <p:nvGrpSpPr>
+        <p:cNvPr id="1" name=""/>
+        <p:cNvGrpSpPr/>
+        <p:nvPr/>
+      </p:nvGrpSpPr>
+      <p:grpSpPr>
+        <a:xfrm>
+          <a:off x="0" y="0"/>
+          <a:ext cx="0" cy="0"/>
+          <a:chOff x="0" y="0"/>
+          <a:chExt cx="0" cy="0"/>
+        </a:xfrm>
+      </p:grpSpPr>
+      <p:sp>
+        <p:nvSpPr>
+          <p:cNvPr id="2" name="Slide Image Placeholder 1"/>
+          <p:cNvSpPr>
+            <a:spLocks noGrp="1" noRot="1" noChangeAspect="1"/>
+          </p:cNvSpPr>
+          <p:nvPr>
+            <p:ph type="sldImg"/>
+          </p:nvPr>
+        </p:nvSpPr>
+        <p:spPr/>
+      </p:sp>
+      <p:sp>
+        <p:nvSpPr>
+          <p:cNvPr id="3" name="Notes Placeholder 2"/>
+          <p:cNvSpPr>
+            <a:spLocks noGrp="1"/>
+          </p:cNvSpPr>
+          <p:nvPr>
+            <p:ph type="body" idx="1"/>
+          </p:nvPr>
+        </p:nvSpPr>
+        <p:spPr/>
+        <p:txBody>
+          <a:bodyPr/>
+          <a:lstStyle/>
+          <a:p>
             <a:r>
               <a:rPr lang="en-US" dirty="0"/>
-              <a:t>Important websites are like banking websites</a:t>
+              <a:t>sends the email to our </a:t>
+            </a:r>
+            <a:r>
+              <a:rPr lang="en-US" dirty="0" err="1"/>
+              <a:t>gmail</a:t>
+            </a:r>
+            <a:r>
+              <a:rPr lang="en-US" dirty="0"/>
+              <a:t> account created for the keylogger</a:t>
+            </a:r>
+          </a:p>
+          <a:p>
+            <a:endParaRPr lang="en-US" dirty="0"/>
+          </a:p>
+          <a:p>
+            <a:r>
+              <a:rPr lang="en-US" dirty="0"/>
+              <a:t>Listener with </a:t>
+            </a:r>
+            <a:r>
+              <a:rPr lang="en-US" dirty="0" err="1"/>
+              <a:t>onpress</a:t>
+            </a:r>
+            <a:r>
+              <a:rPr lang="en-US" dirty="0"/>
+              <a:t> used to collect keyboard events</a:t>
+            </a:r>
+          </a:p>
+        </p:txBody>
+      </p:sp>
+      <p:sp>
+        <p:nvSpPr>
+          <p:cNvPr id="4" name="Slide Number Placeholder 3"/>
+          <p:cNvSpPr>
+            <a:spLocks noGrp="1"/>
+          </p:cNvSpPr>
+          <p:nvPr>
+            <p:ph type="sldNum" sz="quarter" idx="5"/>
+          </p:nvPr>
+        </p:nvSpPr>
+        <p:spPr/>
+        <p:txBody>
+          <a:bodyPr/>
+          <a:lstStyle/>
+          <a:p>
+            <a:fld id="{CE989B39-9896-4416-8F69-B5D2DF855C70}" type="slidenum">
+              <a:rPr lang="en-US" smtClean="0"/>
+              <a:t>8</a:t>
+            </a:fld>
+            <a:endParaRPr lang="en-US"/>
+          </a:p>
+        </p:txBody>
+      </p:sp>
+    </p:spTree>
+    <p:extLst>
+      <p:ext uri="{BB962C8B-B14F-4D97-AF65-F5344CB8AC3E}">
+        <p14:creationId xmlns:p14="http://schemas.microsoft.com/office/powerpoint/2010/main" val="225436227"/>
+      </p:ext>
+    </p:extLst>
+  </p:cSld>
+  <p:clrMapOvr>
+    <a:masterClrMapping/>
+  </p:clrMapOvr>
+</p:notes>
+</file>
+
+<file path=ppt/notesSlides/notesSlide4.xml><?xml version="1.0" encoding="utf-8"?>
+<p:notes xmlns:a="http://schemas.openxmlformats.org/drawingml/2006/main" xmlns:r="http://schemas.openxmlformats.org/officeDocument/2006/relationships" xmlns:p="http://schemas.openxmlformats.org/presentationml/2006/main">
+  <p:cSld>
+    <p:spTree>
+      <p:nvGrpSpPr>
+        <p:cNvPr id="1" name=""/>
+        <p:cNvGrpSpPr/>
+        <p:nvPr/>
+      </p:nvGrpSpPr>
+      <p:grpSpPr>
+        <a:xfrm>
+          <a:off x="0" y="0"/>
+          <a:ext cx="0" cy="0"/>
+          <a:chOff x="0" y="0"/>
+          <a:chExt cx="0" cy="0"/>
+        </a:xfrm>
+      </p:grpSpPr>
+      <p:sp>
+        <p:nvSpPr>
+          <p:cNvPr id="2" name="Slide Image Placeholder 1"/>
+          <p:cNvSpPr>
+            <a:spLocks noGrp="1" noRot="1" noChangeAspect="1"/>
+          </p:cNvSpPr>
+          <p:nvPr>
+            <p:ph type="sldImg"/>
+          </p:nvPr>
+        </p:nvSpPr>
+        <p:spPr/>
+      </p:sp>
+      <p:sp>
+        <p:nvSpPr>
+          <p:cNvPr id="3" name="Notes Placeholder 2"/>
+          <p:cNvSpPr>
+            <a:spLocks noGrp="1"/>
+          </p:cNvSpPr>
+          <p:nvPr>
+            <p:ph type="body" idx="1"/>
+          </p:nvPr>
+        </p:nvSpPr>
+        <p:spPr/>
+        <p:txBody>
+          <a:bodyPr/>
+          <a:lstStyle/>
+          <a:p>
+            <a:r>
+              <a:rPr lang="en-US" dirty="0"/>
+              <a:t>-quick little example of how it works</a:t>
+            </a:r>
+          </a:p>
+          <a:p>
+            <a:r>
+              <a:rPr lang="en-US" dirty="0"/>
+              <a:t>-victim has typed into the google </a:t>
+            </a:r>
+            <a:r>
+              <a:rPr lang="en-US" dirty="0" err="1"/>
+              <a:t>searchbar</a:t>
+            </a:r>
+            <a:r>
+              <a:rPr lang="en-US" dirty="0"/>
+              <a:t> while keylogger is active</a:t>
+            </a:r>
+          </a:p>
+          <a:p>
+            <a:r>
+              <a:rPr lang="en-US" dirty="0"/>
+              <a:t>-after 50 chars (52 to be exact), keylogger sent an email of what victim typed</a:t>
+            </a:r>
+          </a:p>
+        </p:txBody>
+      </p:sp>
+      <p:sp>
+        <p:nvSpPr>
+          <p:cNvPr id="4" name="Slide Number Placeholder 3"/>
+          <p:cNvSpPr>
+            <a:spLocks noGrp="1"/>
+          </p:cNvSpPr>
+          <p:nvPr>
+            <p:ph type="sldNum" sz="quarter" idx="5"/>
+          </p:nvPr>
+        </p:nvSpPr>
+        <p:spPr/>
+        <p:txBody>
+          <a:bodyPr/>
+          <a:lstStyle/>
+          <a:p>
+            <a:fld id="{CE989B39-9896-4416-8F69-B5D2DF855C70}" type="slidenum">
+              <a:rPr lang="en-US" smtClean="0"/>
+              <a:t>9</a:t>
+            </a:fld>
+            <a:endParaRPr lang="en-US"/>
+          </a:p>
+        </p:txBody>
+      </p:sp>
+    </p:spTree>
+    <p:extLst>
+      <p:ext uri="{BB962C8B-B14F-4D97-AF65-F5344CB8AC3E}">
+        <p14:creationId xmlns:p14="http://schemas.microsoft.com/office/powerpoint/2010/main" val="156229535"/>
+      </p:ext>
+    </p:extLst>
+  </p:cSld>
+  <p:clrMapOvr>
+    <a:masterClrMapping/>
+  </p:clrMapOvr>
+</p:notes>
+</file>
+
+<file path=ppt/notesSlides/notesSlide5.xml><?xml version="1.0" encoding="utf-8"?>
+<p:notes xmlns:a="http://schemas.openxmlformats.org/drawingml/2006/main" xmlns:r="http://schemas.openxmlformats.org/officeDocument/2006/relationships" xmlns:p="http://schemas.openxmlformats.org/presentationml/2006/main">
+  <p:cSld>
+    <p:spTree>
+      <p:nvGrpSpPr>
+        <p:cNvPr id="1" name=""/>
+        <p:cNvGrpSpPr/>
+        <p:nvPr/>
+      </p:nvGrpSpPr>
+      <p:grpSpPr>
+        <a:xfrm>
+          <a:off x="0" y="0"/>
+          <a:ext cx="0" cy="0"/>
+          <a:chOff x="0" y="0"/>
+          <a:chExt cx="0" cy="0"/>
+        </a:xfrm>
+      </p:grpSpPr>
+      <p:sp>
+        <p:nvSpPr>
+          <p:cNvPr id="2" name="Slide Image Placeholder 1"/>
+          <p:cNvSpPr>
+            <a:spLocks noGrp="1" noRot="1" noChangeAspect="1"/>
+          </p:cNvSpPr>
+          <p:nvPr>
+            <p:ph type="sldImg"/>
+          </p:nvPr>
+        </p:nvSpPr>
+        <p:spPr/>
+      </p:sp>
+      <p:sp>
+        <p:nvSpPr>
+          <p:cNvPr id="3" name="Notes Placeholder 2"/>
+          <p:cNvSpPr>
+            <a:spLocks noGrp="1"/>
+          </p:cNvSpPr>
+          <p:nvPr>
+            <p:ph type="body" idx="1"/>
+          </p:nvPr>
+        </p:nvSpPr>
+        <p:spPr/>
+        <p:txBody>
+          <a:bodyPr/>
+          <a:lstStyle/>
+          <a:p>
+            <a:pPr marL="0" marR="0" lvl="0" indent="0" algn="l" defTabSz="914400" rtl="0" eaLnBrk="1" fontAlgn="auto" latinLnBrk="0" hangingPunct="1">
+              <a:lnSpc>
+                <a:spcPct val="100000"/>
+              </a:lnSpc>
+              <a:spcBef>
+                <a:spcPts val="0"/>
+              </a:spcBef>
+              <a:spcAft>
+                <a:spcPts val="0"/>
+              </a:spcAft>
+              <a:buClrTx/>
+              <a:buSzTx/>
+              <a:buFontTx/>
+              <a:buNone/>
+              <a:tabLst/>
+              <a:defRPr/>
+            </a:pPr>
+            <a:r>
+              <a:rPr lang="en-US" dirty="0"/>
+              <a:t>-allow </a:t>
+            </a:r>
+            <a:r>
+              <a:rPr lang="en-US" b="0" i="0" dirty="0">
+                <a:solidFill>
+                  <a:srgbClr val="202124"/>
+                </a:solidFill>
+                <a:effectLst/>
+                <a:latin typeface="Google Sans"/>
+              </a:rPr>
+              <a:t>less secure apps to access your Google Account</a:t>
+            </a:r>
+          </a:p>
+          <a:p>
+            <a:endParaRPr lang="en-US" dirty="0"/>
+          </a:p>
+          <a:p>
+            <a:r>
+              <a:rPr lang="en-US" dirty="0"/>
+              <a:t>-2 working on</a:t>
+            </a:r>
+          </a:p>
+        </p:txBody>
+      </p:sp>
+      <p:sp>
+        <p:nvSpPr>
+          <p:cNvPr id="4" name="Slide Number Placeholder 3"/>
+          <p:cNvSpPr>
+            <a:spLocks noGrp="1"/>
+          </p:cNvSpPr>
+          <p:nvPr>
+            <p:ph type="sldNum" sz="quarter" idx="5"/>
+          </p:nvPr>
+        </p:nvSpPr>
+        <p:spPr/>
+        <p:txBody>
+          <a:bodyPr/>
+          <a:lstStyle/>
+          <a:p>
+            <a:fld id="{CE989B39-9896-4416-8F69-B5D2DF855C70}" type="slidenum">
+              <a:rPr lang="en-US" smtClean="0"/>
+              <a:t>10</a:t>
+            </a:fld>
+            <a:endParaRPr lang="en-US"/>
+          </a:p>
+        </p:txBody>
+      </p:sp>
+    </p:spTree>
+    <p:extLst>
+      <p:ext uri="{BB962C8B-B14F-4D97-AF65-F5344CB8AC3E}">
+        <p14:creationId xmlns:p14="http://schemas.microsoft.com/office/powerpoint/2010/main" val="526337448"/>
+      </p:ext>
+    </p:extLst>
+  </p:cSld>
+  <p:clrMapOvr>
+    <a:masterClrMapping/>
+  </p:clrMapOvr>
+</p:notes>
+</file>
+
+<file path=ppt/notesSlides/notesSlide6.xml><?xml version="1.0" encoding="utf-8"?>
+<p:notes xmlns:a="http://schemas.openxmlformats.org/drawingml/2006/main" xmlns:r="http://schemas.openxmlformats.org/officeDocument/2006/relationships" xmlns:p="http://schemas.openxmlformats.org/presentationml/2006/main">
+  <p:cSld>
+    <p:spTree>
+      <p:nvGrpSpPr>
+        <p:cNvPr id="1" name=""/>
+        <p:cNvGrpSpPr/>
+        <p:nvPr/>
+      </p:nvGrpSpPr>
+      <p:grpSpPr>
+        <a:xfrm>
+          <a:off x="0" y="0"/>
+          <a:ext cx="0" cy="0"/>
+          <a:chOff x="0" y="0"/>
+          <a:chExt cx="0" cy="0"/>
+        </a:xfrm>
+      </p:grpSpPr>
+      <p:sp>
+        <p:nvSpPr>
+          <p:cNvPr id="2" name="Slide Image Placeholder 1"/>
+          <p:cNvSpPr>
+            <a:spLocks noGrp="1" noRot="1" noChangeAspect="1"/>
+          </p:cNvSpPr>
+          <p:nvPr>
+            <p:ph type="sldImg"/>
+          </p:nvPr>
+        </p:nvSpPr>
+        <p:spPr/>
+      </p:sp>
+      <p:sp>
+        <p:nvSpPr>
+          <p:cNvPr id="3" name="Notes Placeholder 2"/>
+          <p:cNvSpPr>
+            <a:spLocks noGrp="1"/>
+          </p:cNvSpPr>
+          <p:nvPr>
+            <p:ph type="body" idx="1"/>
+          </p:nvPr>
+        </p:nvSpPr>
+        <p:spPr/>
+        <p:txBody>
+          <a:bodyPr/>
+          <a:lstStyle/>
+          <a:p>
+            <a:r>
+              <a:rPr lang="en-US" dirty="0"/>
+              <a:t>-here is some general info on how to protect against keyloggers</a:t>
+            </a:r>
+          </a:p>
+          <a:p>
+            <a:endParaRPr lang="en-US" dirty="0"/>
+          </a:p>
+          <a:p>
+            <a:r>
+              <a:rPr lang="en-US" dirty="0"/>
+              <a:t>SW</a:t>
+            </a:r>
+          </a:p>
+          <a:p>
+            <a:r>
+              <a:rPr lang="en-US" dirty="0"/>
+              <a:t>-I noticed that when the keylogger was running, my cursor sometimes disappeared when I typed</a:t>
+            </a:r>
+          </a:p>
+        </p:txBody>
+      </p:sp>
+      <p:sp>
+        <p:nvSpPr>
+          <p:cNvPr id="4" name="Slide Number Placeholder 3"/>
+          <p:cNvSpPr>
+            <a:spLocks noGrp="1"/>
+          </p:cNvSpPr>
+          <p:nvPr>
+            <p:ph type="sldNum" sz="quarter" idx="5"/>
+          </p:nvPr>
+        </p:nvSpPr>
+        <p:spPr/>
+        <p:txBody>
+          <a:bodyPr/>
+          <a:lstStyle/>
+          <a:p>
+            <a:fld id="{CE989B39-9896-4416-8F69-B5D2DF855C70}" type="slidenum">
+              <a:rPr lang="en-US" smtClean="0"/>
+              <a:t>11</a:t>
+            </a:fld>
+            <a:endParaRPr lang="en-US"/>
+          </a:p>
+        </p:txBody>
+      </p:sp>
+    </p:spTree>
+    <p:extLst>
+      <p:ext uri="{BB962C8B-B14F-4D97-AF65-F5344CB8AC3E}">
+        <p14:creationId xmlns:p14="http://schemas.microsoft.com/office/powerpoint/2010/main" val="3581530524"/>
+      </p:ext>
+    </p:extLst>
+  </p:cSld>
+  <p:clrMapOvr>
+    <a:masterClrMapping/>
+  </p:clrMapOvr>
+</p:notes>
+</file>
+
+<file path=ppt/notesSlides/notesSlide7.xml><?xml version="1.0" encoding="utf-8"?>
+<p:notes xmlns:a="http://schemas.openxmlformats.org/drawingml/2006/main" xmlns:r="http://schemas.openxmlformats.org/officeDocument/2006/relationships" xmlns:p="http://schemas.openxmlformats.org/presentationml/2006/main">
+  <p:cSld>
+    <p:spTree>
+      <p:nvGrpSpPr>
+        <p:cNvPr id="1" name=""/>
+        <p:cNvGrpSpPr/>
+        <p:nvPr/>
+      </p:nvGrpSpPr>
+      <p:grpSpPr>
+        <a:xfrm>
+          <a:off x="0" y="0"/>
+          <a:ext cx="0" cy="0"/>
+          <a:chOff x="0" y="0"/>
+          <a:chExt cx="0" cy="0"/>
+        </a:xfrm>
+      </p:grpSpPr>
+      <p:sp>
+        <p:nvSpPr>
+          <p:cNvPr id="2" name="Slide Image Placeholder 1"/>
+          <p:cNvSpPr>
+            <a:spLocks noGrp="1" noRot="1" noChangeAspect="1"/>
+          </p:cNvSpPr>
+          <p:nvPr>
+            <p:ph type="sldImg"/>
+          </p:nvPr>
+        </p:nvSpPr>
+        <p:spPr/>
+      </p:sp>
+      <p:sp>
+        <p:nvSpPr>
+          <p:cNvPr id="3" name="Notes Placeholder 2"/>
+          <p:cNvSpPr>
+            <a:spLocks noGrp="1"/>
+          </p:cNvSpPr>
+          <p:nvPr>
+            <p:ph type="body" idx="1"/>
+          </p:nvPr>
+        </p:nvSpPr>
+        <p:spPr/>
+        <p:txBody>
+          <a:bodyPr/>
+          <a:lstStyle/>
+          <a:p>
+            <a:r>
+              <a:rPr lang="en-US" dirty="0"/>
+              <a:t>Most of this is good cyber hygiene in general.</a:t>
+            </a:r>
+          </a:p>
+          <a:p>
+            <a:endParaRPr lang="en-US" dirty="0"/>
+          </a:p>
+          <a:p>
+            <a:r>
+              <a:rPr lang="en-US" dirty="0"/>
+              <a:t>Use 2FA when available</a:t>
+            </a:r>
+          </a:p>
+          <a:p>
+            <a:endParaRPr lang="en-US" dirty="0"/>
+          </a:p>
+          <a:p>
+            <a:r>
+              <a:rPr lang="en-US" dirty="0"/>
+              <a:t>Anti spyware &amp; malware programs</a:t>
+            </a:r>
+          </a:p>
+          <a:p>
+            <a:r>
+              <a:rPr lang="en-US" dirty="0"/>
+              <a:t>- When I first downloaded the keylogger to work on it more after Lauren had already started it, windows defender detected and removed it</a:t>
+            </a:r>
+          </a:p>
+          <a:p>
+            <a:endParaRPr lang="en-US" dirty="0"/>
+          </a:p>
+          <a:p>
+            <a:pPr marL="0" marR="0" lvl="0" indent="0" algn="l" defTabSz="914400" rtl="0" eaLnBrk="1" fontAlgn="auto" latinLnBrk="0" hangingPunct="1">
+              <a:lnSpc>
+                <a:spcPct val="100000"/>
+              </a:lnSpc>
+              <a:spcBef>
+                <a:spcPts val="0"/>
+              </a:spcBef>
+              <a:spcAft>
+                <a:spcPts val="0"/>
+              </a:spcAft>
+              <a:buClrTx/>
+              <a:buSzTx/>
+              <a:buFontTx/>
+              <a:buNone/>
+              <a:tabLst/>
+              <a:defRPr/>
+            </a:pPr>
+            <a:r>
+              <a:rPr lang="en-US" dirty="0"/>
+              <a:t>Important websites, such as banking sites</a:t>
+            </a:r>
+          </a:p>
+          <a:p>
+            <a:r>
+              <a:rPr lang="en-US" dirty="0"/>
+              <a:t>Virtual keyboard, if you are afraid of a keylogger. Some loggers do not account for virtual keyboards – but some do</a:t>
             </a:r>
           </a:p>
         </p:txBody>
@@ -17759,7 +18571,7 @@
           <a:p>
             <a:fld id="{A13380DB-5CEA-4C6A-826F-36121847154C}" type="datetimeFigureOut">
               <a:rPr lang="en-US" smtClean="0"/>
-              <a:t>4/30/2021</a:t>
+              <a:t>2021-05-04</a:t>
             </a:fld>
             <a:endParaRPr lang="en-US"/>
           </a:p>
@@ -17938,7 +18750,7 @@
           <a:p>
             <a:fld id="{A13380DB-5CEA-4C6A-826F-36121847154C}" type="datetimeFigureOut">
               <a:rPr lang="en-US" smtClean="0"/>
-              <a:t>4/30/2021</a:t>
+              <a:t>2021-05-04</a:t>
             </a:fld>
             <a:endParaRPr lang="en-US"/>
           </a:p>
@@ -18118,7 +18930,7 @@
           <a:p>
             <a:fld id="{A13380DB-5CEA-4C6A-826F-36121847154C}" type="datetimeFigureOut">
               <a:rPr lang="en-US" smtClean="0"/>
-              <a:t>4/30/2021</a:t>
+              <a:t>2021-05-04</a:t>
             </a:fld>
             <a:endParaRPr lang="en-US"/>
           </a:p>
@@ -18288,7 +19100,7 @@
           <a:p>
             <a:fld id="{A13380DB-5CEA-4C6A-826F-36121847154C}" type="datetimeFigureOut">
               <a:rPr lang="en-US" smtClean="0"/>
-              <a:t>4/30/2021</a:t>
+              <a:t>2021-05-04</a:t>
             </a:fld>
             <a:endParaRPr lang="en-US"/>
           </a:p>
@@ -18601,7 +19413,7 @@
           <a:p>
             <a:fld id="{A13380DB-5CEA-4C6A-826F-36121847154C}" type="datetimeFigureOut">
               <a:rPr lang="en-US" smtClean="0"/>
-              <a:t>4/30/2021</a:t>
+              <a:t>2021-05-04</a:t>
             </a:fld>
             <a:endParaRPr lang="en-US"/>
           </a:p>
@@ -18987,7 +19799,7 @@
           <a:p>
             <a:fld id="{A13380DB-5CEA-4C6A-826F-36121847154C}" type="datetimeFigureOut">
               <a:rPr lang="en-US" smtClean="0"/>
-              <a:t>4/30/2021</a:t>
+              <a:t>2021-05-04</a:t>
             </a:fld>
             <a:endParaRPr lang="en-US"/>
           </a:p>
@@ -19421,7 +20233,7 @@
           <a:p>
             <a:fld id="{A13380DB-5CEA-4C6A-826F-36121847154C}" type="datetimeFigureOut">
               <a:rPr lang="en-US" smtClean="0"/>
-              <a:t>4/30/2021</a:t>
+              <a:t>2021-05-04</a:t>
             </a:fld>
             <a:endParaRPr lang="en-US"/>
           </a:p>
@@ -19539,7 +20351,7 @@
           <a:p>
             <a:fld id="{A13380DB-5CEA-4C6A-826F-36121847154C}" type="datetimeFigureOut">
               <a:rPr lang="en-US" smtClean="0"/>
-              <a:t>4/30/2021</a:t>
+              <a:t>2021-05-04</a:t>
             </a:fld>
             <a:endParaRPr lang="en-US"/>
           </a:p>
@@ -19634,7 +20446,7 @@
           <a:p>
             <a:fld id="{A13380DB-5CEA-4C6A-826F-36121847154C}" type="datetimeFigureOut">
               <a:rPr lang="en-US" smtClean="0"/>
-              <a:t>4/30/2021</a:t>
+              <a:t>2021-05-04</a:t>
             </a:fld>
             <a:endParaRPr lang="en-US"/>
           </a:p>
@@ -19984,7 +20796,7 @@
           <a:p>
             <a:fld id="{A13380DB-5CEA-4C6A-826F-36121847154C}" type="datetimeFigureOut">
               <a:rPr lang="en-US" smtClean="0"/>
-              <a:t>4/30/2021</a:t>
+              <a:t>2021-05-04</a:t>
             </a:fld>
             <a:endParaRPr lang="en-US"/>
           </a:p>
@@ -20409,7 +21221,7 @@
           <a:p>
             <a:fld id="{A13380DB-5CEA-4C6A-826F-36121847154C}" type="datetimeFigureOut">
               <a:rPr lang="en-US" smtClean="0"/>
-              <a:t>4/30/2021</a:t>
+              <a:t>2021-05-04</a:t>
             </a:fld>
             <a:endParaRPr lang="en-US"/>
           </a:p>
@@ -20690,7 +21502,7 @@
           <a:p>
             <a:fld id="{A13380DB-5CEA-4C6A-826F-36121847154C}" type="datetimeFigureOut">
               <a:rPr lang="en-US" smtClean="0"/>
-              <a:t>4/30/2021</a:t>
+              <a:t>2021-05-04</a:t>
             </a:fld>
             <a:endParaRPr lang="en-US"/>
           </a:p>
@@ -21427,13 +22239,13 @@
             <a:avLst/>
           </a:prstGeom>
           <a:blipFill dpi="0" rotWithShape="1">
-            <a:blip r:embed="rId2">
+            <a:blip r:embed="rId3">
               <a:alphaModFix amt="85000"/>
               <a:lum bright="70000" contrast="-70000"/>
               <a:extLst>
                 <a:ext uri="{BEBA8EAE-BF5A-486C-A8C5-ECC9F3942E4B}">
                   <a14:imgProps xmlns:a14="http://schemas.microsoft.com/office/drawing/2010/main">
-                    <a14:imgLayer r:embed="rId3">
+                    <a14:imgLayer r:embed="rId4">
                       <a14:imgEffect>
                         <a14:sharpenSoften amount="61000"/>
                       </a14:imgEffect>
@@ -21504,7 +22316,7 @@
         </p:xfrm>
         <a:graphic>
           <a:graphicData uri="http://schemas.openxmlformats.org/drawingml/2006/diagram">
-            <dgm:relIds xmlns:dgm="http://schemas.openxmlformats.org/drawingml/2006/diagram" xmlns:r="http://schemas.openxmlformats.org/officeDocument/2006/relationships" r:dm="rId4" r:lo="rId5" r:qs="rId6" r:cs="rId7"/>
+            <dgm:relIds xmlns:dgm="http://schemas.openxmlformats.org/drawingml/2006/diagram" xmlns:r="http://schemas.openxmlformats.org/officeDocument/2006/relationships" r:dm="rId5" r:lo="rId6" r:qs="rId7" r:cs="rId8"/>
           </a:graphicData>
         </a:graphic>
       </p:graphicFrame>
@@ -21613,13 +22425,13 @@
             <a:avLst/>
           </a:prstGeom>
           <a:blipFill dpi="0" rotWithShape="1">
-            <a:blip r:embed="rId2">
+            <a:blip r:embed="rId3">
               <a:alphaModFix amt="85000"/>
               <a:lum bright="70000" contrast="-70000"/>
               <a:extLst>
                 <a:ext uri="{BEBA8EAE-BF5A-486C-A8C5-ECC9F3942E4B}">
                   <a14:imgProps xmlns:a14="http://schemas.microsoft.com/office/drawing/2010/main">
-                    <a14:imgLayer r:embed="rId3">
+                    <a14:imgLayer r:embed="rId4">
                       <a14:imgEffect>
                         <a14:sharpenSoften amount="61000"/>
                       </a14:imgEffect>
@@ -21690,7 +22502,7 @@
         </p:xfrm>
         <a:graphic>
           <a:graphicData uri="http://schemas.openxmlformats.org/drawingml/2006/diagram">
-            <dgm:relIds xmlns:dgm="http://schemas.openxmlformats.org/drawingml/2006/diagram" xmlns:r="http://schemas.openxmlformats.org/officeDocument/2006/relationships" r:dm="rId4" r:lo="rId5" r:qs="rId6" r:cs="rId7"/>
+            <dgm:relIds xmlns:dgm="http://schemas.openxmlformats.org/drawingml/2006/diagram" xmlns:r="http://schemas.openxmlformats.org/officeDocument/2006/relationships" r:dm="rId5" r:lo="rId6" r:qs="rId7" r:cs="rId8"/>
           </a:graphicData>
         </a:graphic>
       </p:graphicFrame>
@@ -23059,7 +23871,7 @@
             <a:avLst/>
           </a:prstGeom>
           <a:blipFill dpi="0" rotWithShape="1">
-            <a:blip r:embed="rId2">
+            <a:blip r:embed="rId3">
               <a:duotone>
                 <a:schemeClr val="accent1">
                   <a:shade val="45000"/>
@@ -23070,7 +23882,7 @@
               <a:extLst>
                 <a:ext uri="{BEBA8EAE-BF5A-486C-A8C5-ECC9F3942E4B}">
                   <a14:imgProps xmlns:a14="http://schemas.microsoft.com/office/drawing/2010/main">
-                    <a14:imgLayer r:embed="rId3">
+                    <a14:imgLayer r:embed="rId4">
                       <a14:imgEffect>
                         <a14:saturation sat="400000"/>
                       </a14:imgEffect>
@@ -23175,7 +23987,7 @@
           <a:p>
             <a:r>
               <a:rPr lang="en-US" dirty="0" err="1"/>
-              <a:t>Key_logger</a:t>
+              <a:t>key_logger</a:t>
             </a:r>
             <a:r>
               <a:rPr lang="en-US" dirty="0"/>
@@ -23183,7 +23995,7 @@
             </a:r>
             <a:r>
               <a:rPr lang="en-US" dirty="0" err="1"/>
-              <a:t>py</a:t>
+              <a:t>pyw</a:t>
             </a:r>
             <a:r>
               <a:rPr lang="en-US" dirty="0"/>
@@ -23199,7 +24011,7 @@
           <a:p>
             <a:r>
               <a:rPr lang="en-US" dirty="0"/>
-              <a:t>The Key_logger.py runs in the background and periodically sends emails to the keylogger email</a:t>
+              <a:t>The key_logger.py runs in the background and periodically sends emails to the keylogger email</a:t>
             </a:r>
           </a:p>
           <a:p>
@@ -23263,7 +24075,7 @@
             <a:avLst/>
           </a:prstGeom>
           <a:blipFill dpi="0" rotWithShape="1">
-            <a:blip r:embed="rId4">
+            <a:blip r:embed="rId5">
               <a:duotone>
                 <a:schemeClr val="accent1">
                   <a:shade val="45000"/>
@@ -23567,7 +24379,7 @@
           <a:p>
             <a:r>
               <a:rPr lang="en-US" dirty="0"/>
-              <a:t>By changing the Launch options of IE whenever the user clicks on the supplication the keylogger will also be launched</a:t>
+              <a:t>By changing the Launch options of IE whenever the user clicks on the application the keylogger will also be launched</a:t>
             </a:r>
           </a:p>
         </p:txBody>
@@ -23642,7 +24454,7 @@
             <a:avLst/>
           </a:prstGeom>
           <a:blipFill dpi="0" rotWithShape="1">
-            <a:blip r:embed="rId2">
+            <a:blip r:embed="rId3">
               <a:alphaModFix amt="60000"/>
               <a:lum bright="70000" contrast="-70000"/>
               <a:extLst>
@@ -23736,7 +24548,7 @@
           <p:nvPr/>
         </p:nvPicPr>
         <p:blipFill rotWithShape="1">
-          <a:blip r:embed="rId3">
+          <a:blip r:embed="rId4">
             <a:extLst>
               <a:ext uri="{28A0092B-C50C-407E-A947-70E740481C1C}">
                 <a14:useLocalDpi xmlns:a14="http://schemas.microsoft.com/office/drawing/2010/main" val="0"/>
@@ -23925,7 +24737,7 @@
               <a:avLst/>
             </a:prstGeom>
             <a:blipFill dpi="0" rotWithShape="1">
-              <a:blip r:embed="rId4">
+              <a:blip r:embed="rId5">
                 <a:duotone>
                   <a:schemeClr val="accent1">
                     <a:shade val="45000"/>
@@ -24188,13 +25000,13 @@
             <a:avLst/>
           </a:prstGeom>
           <a:blipFill dpi="0" rotWithShape="1">
-            <a:blip r:embed="rId2">
+            <a:blip r:embed="rId3">
               <a:alphaModFix amt="85000"/>
               <a:lum bright="70000" contrast="-70000"/>
               <a:extLst>
                 <a:ext uri="{BEBA8EAE-BF5A-486C-A8C5-ECC9F3942E4B}">
                   <a14:imgProps xmlns:a14="http://schemas.microsoft.com/office/drawing/2010/main">
-                    <a14:imgLayer r:embed="rId3">
+                    <a14:imgLayer r:embed="rId4">
                       <a14:imgEffect>
                         <a14:sharpenSoften amount="61000"/>
                       </a14:imgEffect>
@@ -24262,13 +25074,13 @@
             <a:avLst/>
           </a:prstGeom>
           <a:blipFill dpi="0" rotWithShape="1">
-            <a:blip r:embed="rId2">
+            <a:blip r:embed="rId3">
               <a:alphaModFix amt="85000"/>
               <a:lum bright="70000" contrast="-70000"/>
               <a:extLst>
                 <a:ext uri="{BEBA8EAE-BF5A-486C-A8C5-ECC9F3942E4B}">
                   <a14:imgProps xmlns:a14="http://schemas.microsoft.com/office/drawing/2010/main">
-                    <a14:imgLayer r:embed="rId3">
+                    <a14:imgLayer r:embed="rId4">
                       <a14:imgEffect>
                         <a14:sharpenSoften amount="61000"/>
                       </a14:imgEffect>
@@ -24336,13 +25148,13 @@
             <a:avLst/>
           </a:prstGeom>
           <a:blipFill dpi="0" rotWithShape="1">
-            <a:blip r:embed="rId2">
+            <a:blip r:embed="rId3">
               <a:alphaModFix amt="85000"/>
               <a:lum bright="70000" contrast="-70000"/>
               <a:extLst>
                 <a:ext uri="{BEBA8EAE-BF5A-486C-A8C5-ECC9F3942E4B}">
                   <a14:imgProps xmlns:a14="http://schemas.microsoft.com/office/drawing/2010/main">
-                    <a14:imgLayer r:embed="rId3">
+                    <a14:imgLayer r:embed="rId4">
                       <a14:imgEffect>
                         <a14:sharpenSoften amount="61000"/>
                       </a14:imgEffect>
@@ -24429,7 +25241,7 @@
           <p:nvPr/>
         </p:nvPicPr>
         <p:blipFill rotWithShape="1">
-          <a:blip r:embed="rId4">
+          <a:blip r:embed="rId5">
             <a:extLst>
               <a:ext uri="{28A0092B-C50C-407E-A947-70E740481C1C}">
                 <a14:useLocalDpi xmlns:a14="http://schemas.microsoft.com/office/drawing/2010/main" val="0"/>
@@ -24479,13 +25291,16 @@
           <a:p>
             <a:r>
               <a:rPr lang="en-US" dirty="0"/>
-              <a:t>This Code sends the email to our created logger </a:t>
+              <a:t>This code sends the email to our </a:t>
             </a:r>
             <a:r>
               <a:rPr lang="en-US" dirty="0" err="1"/>
               <a:t>gmail</a:t>
             </a:r>
-            <a:endParaRPr lang="en-US" dirty="0"/>
+            <a:r>
+              <a:rPr lang="en-US" dirty="0"/>
+              <a:t> created for logger</a:t>
+            </a:r>
           </a:p>
           <a:p>
             <a:r>
@@ -24572,7 +25387,7 @@
             <a:avLst/>
           </a:prstGeom>
           <a:blipFill dpi="0" rotWithShape="1">
-            <a:blip r:embed="rId5">
+            <a:blip r:embed="rId6">
               <a:duotone>
                 <a:schemeClr val="accent1">
                   <a:shade val="45000"/>
@@ -24751,7 +25566,7 @@
           <p:nvPr/>
         </p:nvPicPr>
         <p:blipFill>
-          <a:blip r:embed="rId2">
+          <a:blip r:embed="rId3">
             <a:extLst>
               <a:ext uri="{28A0092B-C50C-407E-A947-70E740481C1C}">
                 <a14:useLocalDpi xmlns:a14="http://schemas.microsoft.com/office/drawing/2010/main" val="0"/>
@@ -24789,7 +25604,7 @@
           </p:nvPr>
         </p:nvPicPr>
         <p:blipFill>
-          <a:blip r:embed="rId3">
+          <a:blip r:embed="rId4">
             <a:extLst>
               <a:ext uri="{28A0092B-C50C-407E-A947-70E740481C1C}">
                 <a14:useLocalDpi xmlns:a14="http://schemas.microsoft.com/office/drawing/2010/main" val="0"/>

</xml_diff>